<commit_message>
Added graphics stuff, too
</commit_message>
<xml_diff>
--- a/INFO6044/D2D/W_01/INFO_6044_Engine_F22_W01D01_Course_Intro.pptx
+++ b/INFO6044/D2D/W_01/INFO_6044_Engine_F22_W01D01_Course_Intro.pptx
@@ -5315,7 +5315,7 @@
         </p:nvSpPr>
         <p:spPr bwMode="auto">
           <a:xfrm rot="19800300">
-            <a:off x="5099567" y="3500902"/>
+            <a:off x="4870967" y="3500902"/>
             <a:ext cx="3429000" cy="1200150"/>
           </a:xfrm>
           <a:prstGeom prst="leftArrow">
@@ -9042,7 +9042,7 @@
             </a:pPr>
             <a:r>
               <a:rPr lang="en-CA" sz="2000" dirty="0"/>
-              <a:t>Final exam: around week 14</a:t>
+              <a:t>Final exam: around week “15” exam week</a:t>
             </a:r>
             <a:endParaRPr lang="en-CA" sz="1800" dirty="0"/>
           </a:p>

</xml_diff>